<commit_message>
Added not to use external forecasting benchmark.
</commit_message>
<xml_diff>
--- a/Forecasting.pptx
+++ b/Forecasting.pptx
@@ -317,7 +317,7 @@
   </p:defaultTextStyle>
   <p:extLst>
     <p:ext uri="{EFAFB233-063F-42B5-8137-9DF3F51BA10A}">
-      <p15:sldGuideLst xmlns="" xmlns:p15="http://schemas.microsoft.com/office/powerpoint/2012/main">
+      <p15:sldGuideLst xmlns:p15="http://schemas.microsoft.com/office/powerpoint/2012/main" xmlns="">
         <p15:guide id="1" orient="horz" pos="3400">
           <p15:clr>
             <a:srgbClr val="A4A3A4"/>
@@ -427,7 +427,7 @@
           <a:p>
             <a:fld id="{37C50D7F-5172-434D-9E20-E71FDF806C79}" type="datetimeFigureOut">
               <a:rPr lang="en-GB" smtClean="0"/>
-              <a:t>05/09/2019</a:t>
+              <a:t>06/09/2019</a:t>
             </a:fld>
             <a:endParaRPr lang="en-GB"/>
           </a:p>
@@ -2518,7 +2518,7 @@
           </a:ln>
           <a:extLst>
             <a:ext uri="{C572A759-6A51-4108-AA02-DFA0A04FC94B}">
-              <ma14:wrappingTextBoxFlag xmlns="" xmlns:m="http://schemas.openxmlformats.org/officeDocument/2006/math" xmlns:a14="http://schemas.microsoft.com/office/drawing/2010/main" xmlns:ma14="http://schemas.microsoft.com/office/mac/drawingml/2011/main" val="1"/>
+              <ma14:wrappingTextBoxFlag xmlns:ma14="http://schemas.microsoft.com/office/mac/drawingml/2011/main" xmlns:a14="http://schemas.microsoft.com/office/drawing/2010/main" xmlns:m="http://schemas.openxmlformats.org/officeDocument/2006/math" xmlns="" val="1"/>
             </a:ext>
           </a:extLst>
         </p:spPr>
@@ -2557,7 +2557,7 @@
           </a:ln>
           <a:extLst>
             <a:ext uri="{C572A759-6A51-4108-AA02-DFA0A04FC94B}">
-              <ma14:wrappingTextBoxFlag xmlns="" xmlns:m="http://schemas.openxmlformats.org/officeDocument/2006/math" xmlns:a14="http://schemas.microsoft.com/office/drawing/2010/main" xmlns:ma14="http://schemas.microsoft.com/office/mac/drawingml/2011/main" val="1"/>
+              <ma14:wrappingTextBoxFlag xmlns:ma14="http://schemas.microsoft.com/office/mac/drawingml/2011/main" xmlns:a14="http://schemas.microsoft.com/office/drawing/2010/main" xmlns:m="http://schemas.openxmlformats.org/officeDocument/2006/math" xmlns="" val="1"/>
             </a:ext>
           </a:extLst>
         </p:spPr>
@@ -3769,7 +3769,7 @@
                 <a:gridCol w="3825875">
                   <a:extLst>
                     <a:ext uri="{9D8B030D-6E8A-4147-A177-3AD203B41FA5}">
-                      <a16:colId xmlns="" xmlns:a16="http://schemas.microsoft.com/office/drawing/2014/main" val="20000"/>
+                      <a16:colId xmlns:a16="http://schemas.microsoft.com/office/drawing/2014/main" xmlns="" val="20000"/>
                     </a:ext>
                   </a:extLst>
                 </a:gridCol>
@@ -3842,7 +3842,7 @@
                 </a:tc>
                 <a:extLst>
                   <a:ext uri="{0D108BD9-81ED-4DB2-BD59-A6C34878D82A}">
-                    <a16:rowId xmlns="" xmlns:a16="http://schemas.microsoft.com/office/drawing/2014/main" val="10000"/>
+                    <a16:rowId xmlns:a16="http://schemas.microsoft.com/office/drawing/2014/main" xmlns="" val="10000"/>
                   </a:ext>
                 </a:extLst>
               </a:tr>
@@ -3959,7 +3959,7 @@
                 </a:tc>
                 <a:extLst>
                   <a:ext uri="{0D108BD9-81ED-4DB2-BD59-A6C34878D82A}">
-                    <a16:rowId xmlns="" xmlns:a16="http://schemas.microsoft.com/office/drawing/2014/main" val="10001"/>
+                    <a16:rowId xmlns:a16="http://schemas.microsoft.com/office/drawing/2014/main" xmlns="" val="10001"/>
                   </a:ext>
                 </a:extLst>
               </a:tr>
@@ -4030,7 +4030,7 @@
                 </a:tc>
                 <a:extLst>
                   <a:ext uri="{0D108BD9-81ED-4DB2-BD59-A6C34878D82A}">
-                    <a16:rowId xmlns="" xmlns:a16="http://schemas.microsoft.com/office/drawing/2014/main" val="10002"/>
+                    <a16:rowId xmlns:a16="http://schemas.microsoft.com/office/drawing/2014/main" xmlns="" val="10002"/>
                   </a:ext>
                 </a:extLst>
               </a:tr>
@@ -4117,7 +4117,7 @@
                 </a:tc>
                 <a:extLst>
                   <a:ext uri="{0D108BD9-81ED-4DB2-BD59-A6C34878D82A}">
-                    <a16:rowId xmlns="" xmlns:a16="http://schemas.microsoft.com/office/drawing/2014/main" val="10003"/>
+                    <a16:rowId xmlns:a16="http://schemas.microsoft.com/office/drawing/2014/main" xmlns="" val="10003"/>
                   </a:ext>
                 </a:extLst>
               </a:tr>
@@ -4188,7 +4188,7 @@
                 </a:tc>
                 <a:extLst>
                   <a:ext uri="{0D108BD9-81ED-4DB2-BD59-A6C34878D82A}">
-                    <a16:rowId xmlns="" xmlns:a16="http://schemas.microsoft.com/office/drawing/2014/main" val="10004"/>
+                    <a16:rowId xmlns:a16="http://schemas.microsoft.com/office/drawing/2014/main" xmlns="" val="10004"/>
                   </a:ext>
                 </a:extLst>
               </a:tr>
@@ -4265,7 +4265,7 @@
                 </a:tc>
                 <a:extLst>
                   <a:ext uri="{0D108BD9-81ED-4DB2-BD59-A6C34878D82A}">
-                    <a16:rowId xmlns="" xmlns:a16="http://schemas.microsoft.com/office/drawing/2014/main" val="10005"/>
+                    <a16:rowId xmlns:a16="http://schemas.microsoft.com/office/drawing/2014/main" xmlns="" val="10005"/>
                   </a:ext>
                 </a:extLst>
               </a:tr>
@@ -4366,7 +4366,7 @@
                 </a:tc>
                 <a:extLst>
                   <a:ext uri="{0D108BD9-81ED-4DB2-BD59-A6C34878D82A}">
-                    <a16:rowId xmlns="" xmlns:a16="http://schemas.microsoft.com/office/drawing/2014/main" val="10006"/>
+                    <a16:rowId xmlns:a16="http://schemas.microsoft.com/office/drawing/2014/main" xmlns="" val="10006"/>
                   </a:ext>
                 </a:extLst>
               </a:tr>
@@ -4402,7 +4402,7 @@
                 <a:gridCol w="3825875">
                   <a:extLst>
                     <a:ext uri="{9D8B030D-6E8A-4147-A177-3AD203B41FA5}">
-                      <a16:colId xmlns="" xmlns:a16="http://schemas.microsoft.com/office/drawing/2014/main" val="20000"/>
+                      <a16:colId xmlns:a16="http://schemas.microsoft.com/office/drawing/2014/main" xmlns="" val="20000"/>
                     </a:ext>
                   </a:extLst>
                 </a:gridCol>
@@ -4475,7 +4475,7 @@
                 </a:tc>
                 <a:extLst>
                   <a:ext uri="{0D108BD9-81ED-4DB2-BD59-A6C34878D82A}">
-                    <a16:rowId xmlns="" xmlns:a16="http://schemas.microsoft.com/office/drawing/2014/main" val="10000"/>
+                    <a16:rowId xmlns:a16="http://schemas.microsoft.com/office/drawing/2014/main" xmlns="" val="10000"/>
                   </a:ext>
                 </a:extLst>
               </a:tr>
@@ -4572,7 +4572,7 @@
                 </a:tc>
                 <a:extLst>
                   <a:ext uri="{0D108BD9-81ED-4DB2-BD59-A6C34878D82A}">
-                    <a16:rowId xmlns="" xmlns:a16="http://schemas.microsoft.com/office/drawing/2014/main" val="10001"/>
+                    <a16:rowId xmlns:a16="http://schemas.microsoft.com/office/drawing/2014/main" xmlns="" val="10001"/>
                   </a:ext>
                 </a:extLst>
               </a:tr>
@@ -4643,7 +4643,7 @@
                 </a:tc>
                 <a:extLst>
                   <a:ext uri="{0D108BD9-81ED-4DB2-BD59-A6C34878D82A}">
-                    <a16:rowId xmlns="" xmlns:a16="http://schemas.microsoft.com/office/drawing/2014/main" val="10002"/>
+                    <a16:rowId xmlns:a16="http://schemas.microsoft.com/office/drawing/2014/main" xmlns="" val="10002"/>
                   </a:ext>
                 </a:extLst>
               </a:tr>
@@ -4694,7 +4694,7 @@
                 </a:tc>
                 <a:extLst>
                   <a:ext uri="{0D108BD9-81ED-4DB2-BD59-A6C34878D82A}">
-                    <a16:rowId xmlns="" xmlns:a16="http://schemas.microsoft.com/office/drawing/2014/main" val="10003"/>
+                    <a16:rowId xmlns:a16="http://schemas.microsoft.com/office/drawing/2014/main" xmlns="" val="10003"/>
                   </a:ext>
                 </a:extLst>
               </a:tr>
@@ -4771,7 +4771,7 @@
                 </a:tc>
                 <a:extLst>
                   <a:ext uri="{0D108BD9-81ED-4DB2-BD59-A6C34878D82A}">
-                    <a16:rowId xmlns="" xmlns:a16="http://schemas.microsoft.com/office/drawing/2014/main" val="10004"/>
+                    <a16:rowId xmlns:a16="http://schemas.microsoft.com/office/drawing/2014/main" xmlns="" val="10004"/>
                   </a:ext>
                 </a:extLst>
               </a:tr>
@@ -4848,7 +4848,7 @@
                 </a:tc>
                 <a:extLst>
                   <a:ext uri="{0D108BD9-81ED-4DB2-BD59-A6C34878D82A}">
-                    <a16:rowId xmlns="" xmlns:a16="http://schemas.microsoft.com/office/drawing/2014/main" val="10005"/>
+                    <a16:rowId xmlns:a16="http://schemas.microsoft.com/office/drawing/2014/main" xmlns="" val="10005"/>
                   </a:ext>
                 </a:extLst>
               </a:tr>
@@ -4949,7 +4949,7 @@
                 </a:tc>
                 <a:extLst>
                   <a:ext uri="{0D108BD9-81ED-4DB2-BD59-A6C34878D82A}">
-                    <a16:rowId xmlns="" xmlns:a16="http://schemas.microsoft.com/office/drawing/2014/main" val="10006"/>
+                    <a16:rowId xmlns:a16="http://schemas.microsoft.com/office/drawing/2014/main" xmlns="" val="10006"/>
                   </a:ext>
                 </a:extLst>
               </a:tr>
@@ -5264,7 +5264,7 @@
                 <a:gridCol w="3825875">
                   <a:extLst>
                     <a:ext uri="{9D8B030D-6E8A-4147-A177-3AD203B41FA5}">
-                      <a16:colId xmlns="" xmlns:a16="http://schemas.microsoft.com/office/drawing/2014/main" val="20000"/>
+                      <a16:colId xmlns:a16="http://schemas.microsoft.com/office/drawing/2014/main" xmlns="" val="20000"/>
                     </a:ext>
                   </a:extLst>
                 </a:gridCol>
@@ -5337,7 +5337,7 @@
                 </a:tc>
                 <a:extLst>
                   <a:ext uri="{0D108BD9-81ED-4DB2-BD59-A6C34878D82A}">
-                    <a16:rowId xmlns="" xmlns:a16="http://schemas.microsoft.com/office/drawing/2014/main" val="10000"/>
+                    <a16:rowId xmlns:a16="http://schemas.microsoft.com/office/drawing/2014/main" xmlns="" val="10000"/>
                   </a:ext>
                 </a:extLst>
               </a:tr>
@@ -5425,7 +5425,7 @@
                 </a:tc>
                 <a:extLst>
                   <a:ext uri="{0D108BD9-81ED-4DB2-BD59-A6C34878D82A}">
-                    <a16:rowId xmlns="" xmlns:a16="http://schemas.microsoft.com/office/drawing/2014/main" val="10001"/>
+                    <a16:rowId xmlns:a16="http://schemas.microsoft.com/office/drawing/2014/main" xmlns="" val="10001"/>
                   </a:ext>
                 </a:extLst>
               </a:tr>
@@ -5461,7 +5461,7 @@
                 <a:gridCol w="3825875">
                   <a:extLst>
                     <a:ext uri="{9D8B030D-6E8A-4147-A177-3AD203B41FA5}">
-                      <a16:colId xmlns="" xmlns:a16="http://schemas.microsoft.com/office/drawing/2014/main" val="20000"/>
+                      <a16:colId xmlns:a16="http://schemas.microsoft.com/office/drawing/2014/main" xmlns="" val="20000"/>
                     </a:ext>
                   </a:extLst>
                 </a:gridCol>
@@ -5534,7 +5534,7 @@
                 </a:tc>
                 <a:extLst>
                   <a:ext uri="{0D108BD9-81ED-4DB2-BD59-A6C34878D82A}">
-                    <a16:rowId xmlns="" xmlns:a16="http://schemas.microsoft.com/office/drawing/2014/main" val="10000"/>
+                    <a16:rowId xmlns:a16="http://schemas.microsoft.com/office/drawing/2014/main" xmlns="" val="10000"/>
                   </a:ext>
                 </a:extLst>
               </a:tr>
@@ -5634,7 +5634,7 @@
                 </a:tc>
                 <a:extLst>
                   <a:ext uri="{0D108BD9-81ED-4DB2-BD59-A6C34878D82A}">
-                    <a16:rowId xmlns="" xmlns:a16="http://schemas.microsoft.com/office/drawing/2014/main" val="10001"/>
+                    <a16:rowId xmlns:a16="http://schemas.microsoft.com/office/drawing/2014/main" xmlns="" val="10001"/>
                   </a:ext>
                 </a:extLst>
               </a:tr>
@@ -5728,7 +5728,7 @@
                 </a:tc>
                 <a:extLst>
                   <a:ext uri="{0D108BD9-81ED-4DB2-BD59-A6C34878D82A}">
-                    <a16:rowId xmlns="" xmlns:a16="http://schemas.microsoft.com/office/drawing/2014/main" val="10002"/>
+                    <a16:rowId xmlns:a16="http://schemas.microsoft.com/office/drawing/2014/main" xmlns="" val="10002"/>
                   </a:ext>
                 </a:extLst>
               </a:tr>
@@ -5858,7 +5858,7 @@
                 </a:tc>
                 <a:extLst>
                   <a:ext uri="{0D108BD9-81ED-4DB2-BD59-A6C34878D82A}">
-                    <a16:rowId xmlns="" xmlns:a16="http://schemas.microsoft.com/office/drawing/2014/main" val="10003"/>
+                    <a16:rowId xmlns:a16="http://schemas.microsoft.com/office/drawing/2014/main" xmlns="" val="10003"/>
                   </a:ext>
                 </a:extLst>
               </a:tr>
@@ -5929,7 +5929,7 @@
                 </a:tc>
                 <a:extLst>
                   <a:ext uri="{0D108BD9-81ED-4DB2-BD59-A6C34878D82A}">
-                    <a16:rowId xmlns="" xmlns:a16="http://schemas.microsoft.com/office/drawing/2014/main" val="10004"/>
+                    <a16:rowId xmlns:a16="http://schemas.microsoft.com/office/drawing/2014/main" xmlns="" val="10004"/>
                   </a:ext>
                 </a:extLst>
               </a:tr>
@@ -6006,7 +6006,7 @@
                 </a:tc>
                 <a:extLst>
                   <a:ext uri="{0D108BD9-81ED-4DB2-BD59-A6C34878D82A}">
-                    <a16:rowId xmlns="" xmlns:a16="http://schemas.microsoft.com/office/drawing/2014/main" val="10005"/>
+                    <a16:rowId xmlns:a16="http://schemas.microsoft.com/office/drawing/2014/main" xmlns="" val="10005"/>
                   </a:ext>
                 </a:extLst>
               </a:tr>
@@ -6117,7 +6117,7 @@
                 </a:tc>
                 <a:extLst>
                   <a:ext uri="{0D108BD9-81ED-4DB2-BD59-A6C34878D82A}">
-                    <a16:rowId xmlns="" xmlns:a16="http://schemas.microsoft.com/office/drawing/2014/main" val="10006"/>
+                    <a16:rowId xmlns:a16="http://schemas.microsoft.com/office/drawing/2014/main" xmlns="" val="10006"/>
                   </a:ext>
                 </a:extLst>
               </a:tr>
@@ -6153,7 +6153,7 @@
                 <a:gridCol w="3825875">
                   <a:extLst>
                     <a:ext uri="{9D8B030D-6E8A-4147-A177-3AD203B41FA5}">
-                      <a16:colId xmlns="" xmlns:a16="http://schemas.microsoft.com/office/drawing/2014/main" val="20000"/>
+                      <a16:colId xmlns:a16="http://schemas.microsoft.com/office/drawing/2014/main" xmlns="" val="20000"/>
                     </a:ext>
                   </a:extLst>
                 </a:gridCol>
@@ -6226,7 +6226,7 @@
                 </a:tc>
                 <a:extLst>
                   <a:ext uri="{0D108BD9-81ED-4DB2-BD59-A6C34878D82A}">
-                    <a16:rowId xmlns="" xmlns:a16="http://schemas.microsoft.com/office/drawing/2014/main" val="10000"/>
+                    <a16:rowId xmlns:a16="http://schemas.microsoft.com/office/drawing/2014/main" xmlns="" val="10000"/>
                   </a:ext>
                 </a:extLst>
               </a:tr>
@@ -6327,7 +6327,7 @@
                 </a:tc>
                 <a:extLst>
                   <a:ext uri="{0D108BD9-81ED-4DB2-BD59-A6C34878D82A}">
-                    <a16:rowId xmlns="" xmlns:a16="http://schemas.microsoft.com/office/drawing/2014/main" val="10001"/>
+                    <a16:rowId xmlns:a16="http://schemas.microsoft.com/office/drawing/2014/main" xmlns="" val="10001"/>
                   </a:ext>
                 </a:extLst>
               </a:tr>
@@ -6411,7 +6411,7 @@
                 </a:tc>
                 <a:extLst>
                   <a:ext uri="{0D108BD9-81ED-4DB2-BD59-A6C34878D82A}">
-                    <a16:rowId xmlns="" xmlns:a16="http://schemas.microsoft.com/office/drawing/2014/main" val="10002"/>
+                    <a16:rowId xmlns:a16="http://schemas.microsoft.com/office/drawing/2014/main" xmlns="" val="10002"/>
                   </a:ext>
                 </a:extLst>
               </a:tr>
@@ -6498,7 +6498,7 @@
                 </a:tc>
                 <a:extLst>
                   <a:ext uri="{0D108BD9-81ED-4DB2-BD59-A6C34878D82A}">
-                    <a16:rowId xmlns="" xmlns:a16="http://schemas.microsoft.com/office/drawing/2014/main" val="10003"/>
+                    <a16:rowId xmlns:a16="http://schemas.microsoft.com/office/drawing/2014/main" xmlns="" val="10003"/>
                   </a:ext>
                 </a:extLst>
               </a:tr>
@@ -6643,7 +6643,7 @@
                 </a:tc>
                 <a:extLst>
                   <a:ext uri="{0D108BD9-81ED-4DB2-BD59-A6C34878D82A}">
-                    <a16:rowId xmlns="" xmlns:a16="http://schemas.microsoft.com/office/drawing/2014/main" val="10004"/>
+                    <a16:rowId xmlns:a16="http://schemas.microsoft.com/office/drawing/2014/main" xmlns="" val="10004"/>
                   </a:ext>
                 </a:extLst>
               </a:tr>
@@ -6714,7 +6714,7 @@
                 </a:tc>
                 <a:extLst>
                   <a:ext uri="{0D108BD9-81ED-4DB2-BD59-A6C34878D82A}">
-                    <a16:rowId xmlns="" xmlns:a16="http://schemas.microsoft.com/office/drawing/2014/main" val="10005"/>
+                    <a16:rowId xmlns:a16="http://schemas.microsoft.com/office/drawing/2014/main" xmlns="" val="10005"/>
                   </a:ext>
                 </a:extLst>
               </a:tr>
@@ -6791,7 +6791,7 @@
                 </a:tc>
                 <a:extLst>
                   <a:ext uri="{0D108BD9-81ED-4DB2-BD59-A6C34878D82A}">
-                    <a16:rowId xmlns="" xmlns:a16="http://schemas.microsoft.com/office/drawing/2014/main" val="10006"/>
+                    <a16:rowId xmlns:a16="http://schemas.microsoft.com/office/drawing/2014/main" xmlns="" val="10006"/>
                   </a:ext>
                 </a:extLst>
               </a:tr>
@@ -6902,7 +6902,7 @@
                 </a:tc>
                 <a:extLst>
                   <a:ext uri="{0D108BD9-81ED-4DB2-BD59-A6C34878D82A}">
-                    <a16:rowId xmlns="" xmlns:a16="http://schemas.microsoft.com/office/drawing/2014/main" val="10007"/>
+                    <a16:rowId xmlns:a16="http://schemas.microsoft.com/office/drawing/2014/main" xmlns="" val="10007"/>
                   </a:ext>
                 </a:extLst>
               </a:tr>
@@ -6938,7 +6938,7 @@
                 <a:gridCol w="3825875">
                   <a:extLst>
                     <a:ext uri="{9D8B030D-6E8A-4147-A177-3AD203B41FA5}">
-                      <a16:colId xmlns="" xmlns:a16="http://schemas.microsoft.com/office/drawing/2014/main" val="20000"/>
+                      <a16:colId xmlns:a16="http://schemas.microsoft.com/office/drawing/2014/main" xmlns="" val="20000"/>
                     </a:ext>
                   </a:extLst>
                 </a:gridCol>
@@ -7011,7 +7011,7 @@
                 </a:tc>
                 <a:extLst>
                   <a:ext uri="{0D108BD9-81ED-4DB2-BD59-A6C34878D82A}">
-                    <a16:rowId xmlns="" xmlns:a16="http://schemas.microsoft.com/office/drawing/2014/main" val="10000"/>
+                    <a16:rowId xmlns:a16="http://schemas.microsoft.com/office/drawing/2014/main" xmlns="" val="10000"/>
                   </a:ext>
                 </a:extLst>
               </a:tr>
@@ -7112,7 +7112,7 @@
                 </a:tc>
                 <a:extLst>
                   <a:ext uri="{0D108BD9-81ED-4DB2-BD59-A6C34878D82A}">
-                    <a16:rowId xmlns="" xmlns:a16="http://schemas.microsoft.com/office/drawing/2014/main" val="10001"/>
+                    <a16:rowId xmlns:a16="http://schemas.microsoft.com/office/drawing/2014/main" xmlns="" val="10001"/>
                   </a:ext>
                 </a:extLst>
               </a:tr>
@@ -7276,7 +7276,7 @@
                 </a:tc>
                 <a:extLst>
                   <a:ext uri="{0D108BD9-81ED-4DB2-BD59-A6C34878D82A}">
-                    <a16:rowId xmlns="" xmlns:a16="http://schemas.microsoft.com/office/drawing/2014/main" val="10002"/>
+                    <a16:rowId xmlns:a16="http://schemas.microsoft.com/office/drawing/2014/main" xmlns="" val="10002"/>
                   </a:ext>
                 </a:extLst>
               </a:tr>
@@ -7363,7 +7363,7 @@
                 </a:tc>
                 <a:extLst>
                   <a:ext uri="{0D108BD9-81ED-4DB2-BD59-A6C34878D82A}">
-                    <a16:rowId xmlns="" xmlns:a16="http://schemas.microsoft.com/office/drawing/2014/main" val="10003"/>
+                    <a16:rowId xmlns:a16="http://schemas.microsoft.com/office/drawing/2014/main" xmlns="" val="10003"/>
                   </a:ext>
                 </a:extLst>
               </a:tr>
@@ -7430,7 +7430,7 @@
                 </a:tc>
                 <a:extLst>
                   <a:ext uri="{0D108BD9-81ED-4DB2-BD59-A6C34878D82A}">
-                    <a16:rowId xmlns="" xmlns:a16="http://schemas.microsoft.com/office/drawing/2014/main" val="10004"/>
+                    <a16:rowId xmlns:a16="http://schemas.microsoft.com/office/drawing/2014/main" xmlns="" val="10004"/>
                   </a:ext>
                 </a:extLst>
               </a:tr>
@@ -7501,7 +7501,7 @@
                 </a:tc>
                 <a:extLst>
                   <a:ext uri="{0D108BD9-81ED-4DB2-BD59-A6C34878D82A}">
-                    <a16:rowId xmlns="" xmlns:a16="http://schemas.microsoft.com/office/drawing/2014/main" val="10005"/>
+                    <a16:rowId xmlns:a16="http://schemas.microsoft.com/office/drawing/2014/main" xmlns="" val="10005"/>
                   </a:ext>
                 </a:extLst>
               </a:tr>
@@ -7578,7 +7578,7 @@
                 </a:tc>
                 <a:extLst>
                   <a:ext uri="{0D108BD9-81ED-4DB2-BD59-A6C34878D82A}">
-                    <a16:rowId xmlns="" xmlns:a16="http://schemas.microsoft.com/office/drawing/2014/main" val="10006"/>
+                    <a16:rowId xmlns:a16="http://schemas.microsoft.com/office/drawing/2014/main" xmlns="" val="10006"/>
                   </a:ext>
                 </a:extLst>
               </a:tr>
@@ -7689,7 +7689,7 @@
                 </a:tc>
                 <a:extLst>
                   <a:ext uri="{0D108BD9-81ED-4DB2-BD59-A6C34878D82A}">
-                    <a16:rowId xmlns="" xmlns:a16="http://schemas.microsoft.com/office/drawing/2014/main" val="10007"/>
+                    <a16:rowId xmlns:a16="http://schemas.microsoft.com/office/drawing/2014/main" xmlns="" val="10007"/>
                   </a:ext>
                 </a:extLst>
               </a:tr>
@@ -7725,7 +7725,7 @@
                 <a:gridCol w="3825875">
                   <a:extLst>
                     <a:ext uri="{9D8B030D-6E8A-4147-A177-3AD203B41FA5}">
-                      <a16:colId xmlns="" xmlns:a16="http://schemas.microsoft.com/office/drawing/2014/main" val="20000"/>
+                      <a16:colId xmlns:a16="http://schemas.microsoft.com/office/drawing/2014/main" xmlns="" val="20000"/>
                     </a:ext>
                   </a:extLst>
                 </a:gridCol>
@@ -7798,7 +7798,7 @@
                 </a:tc>
                 <a:extLst>
                   <a:ext uri="{0D108BD9-81ED-4DB2-BD59-A6C34878D82A}">
-                    <a16:rowId xmlns="" xmlns:a16="http://schemas.microsoft.com/office/drawing/2014/main" val="10000"/>
+                    <a16:rowId xmlns:a16="http://schemas.microsoft.com/office/drawing/2014/main" xmlns="" val="10000"/>
                   </a:ext>
                 </a:extLst>
               </a:tr>
@@ -7901,7 +7901,7 @@
                 </a:tc>
                 <a:extLst>
                   <a:ext uri="{0D108BD9-81ED-4DB2-BD59-A6C34878D82A}">
-                    <a16:rowId xmlns="" xmlns:a16="http://schemas.microsoft.com/office/drawing/2014/main" val="10001"/>
+                    <a16:rowId xmlns:a16="http://schemas.microsoft.com/office/drawing/2014/main" xmlns="" val="10001"/>
                   </a:ext>
                 </a:extLst>
               </a:tr>
@@ -7987,7 +7987,7 @@
                 </a:tc>
                 <a:extLst>
                   <a:ext uri="{0D108BD9-81ED-4DB2-BD59-A6C34878D82A}">
-                    <a16:rowId xmlns="" xmlns:a16="http://schemas.microsoft.com/office/drawing/2014/main" val="10002"/>
+                    <a16:rowId xmlns:a16="http://schemas.microsoft.com/office/drawing/2014/main" xmlns="" val="10002"/>
                   </a:ext>
                 </a:extLst>
               </a:tr>
@@ -8080,7 +8080,7 @@
                 </a:tc>
                 <a:extLst>
                   <a:ext uri="{0D108BD9-81ED-4DB2-BD59-A6C34878D82A}">
-                    <a16:rowId xmlns="" xmlns:a16="http://schemas.microsoft.com/office/drawing/2014/main" val="10003"/>
+                    <a16:rowId xmlns:a16="http://schemas.microsoft.com/office/drawing/2014/main" xmlns="" val="10003"/>
                   </a:ext>
                 </a:extLst>
               </a:tr>
@@ -8197,7 +8197,7 @@
                 </a:tc>
                 <a:extLst>
                   <a:ext uri="{0D108BD9-81ED-4DB2-BD59-A6C34878D82A}">
-                    <a16:rowId xmlns="" xmlns:a16="http://schemas.microsoft.com/office/drawing/2014/main" val="10007"/>
+                    <a16:rowId xmlns:a16="http://schemas.microsoft.com/office/drawing/2014/main" xmlns="" val="10007"/>
                   </a:ext>
                 </a:extLst>
               </a:tr>
@@ -8233,7 +8233,7 @@
                 <a:gridCol w="3825875">
                   <a:extLst>
                     <a:ext uri="{9D8B030D-6E8A-4147-A177-3AD203B41FA5}">
-                      <a16:colId xmlns="" xmlns:a16="http://schemas.microsoft.com/office/drawing/2014/main" val="20000"/>
+                      <a16:colId xmlns:a16="http://schemas.microsoft.com/office/drawing/2014/main" xmlns="" val="20000"/>
                     </a:ext>
                   </a:extLst>
                 </a:gridCol>
@@ -8306,7 +8306,7 @@
                 </a:tc>
                 <a:extLst>
                   <a:ext uri="{0D108BD9-81ED-4DB2-BD59-A6C34878D82A}">
-                    <a16:rowId xmlns="" xmlns:a16="http://schemas.microsoft.com/office/drawing/2014/main" val="10000"/>
+                    <a16:rowId xmlns:a16="http://schemas.microsoft.com/office/drawing/2014/main" xmlns="" val="10000"/>
                   </a:ext>
                 </a:extLst>
               </a:tr>
@@ -8409,7 +8409,7 @@
                 </a:tc>
                 <a:extLst>
                   <a:ext uri="{0D108BD9-81ED-4DB2-BD59-A6C34878D82A}">
-                    <a16:rowId xmlns="" xmlns:a16="http://schemas.microsoft.com/office/drawing/2014/main" val="10001"/>
+                    <a16:rowId xmlns:a16="http://schemas.microsoft.com/office/drawing/2014/main" xmlns="" val="10001"/>
                   </a:ext>
                 </a:extLst>
               </a:tr>
@@ -8495,7 +8495,7 @@
                 </a:tc>
                 <a:extLst>
                   <a:ext uri="{0D108BD9-81ED-4DB2-BD59-A6C34878D82A}">
-                    <a16:rowId xmlns="" xmlns:a16="http://schemas.microsoft.com/office/drawing/2014/main" val="10002"/>
+                    <a16:rowId xmlns:a16="http://schemas.microsoft.com/office/drawing/2014/main" xmlns="" val="10002"/>
                   </a:ext>
                 </a:extLst>
               </a:tr>
@@ -8588,7 +8588,7 @@
                 </a:tc>
                 <a:extLst>
                   <a:ext uri="{0D108BD9-81ED-4DB2-BD59-A6C34878D82A}">
-                    <a16:rowId xmlns="" xmlns:a16="http://schemas.microsoft.com/office/drawing/2014/main" val="10003"/>
+                    <a16:rowId xmlns:a16="http://schemas.microsoft.com/office/drawing/2014/main" xmlns="" val="10003"/>
                   </a:ext>
                 </a:extLst>
               </a:tr>
@@ -8681,7 +8681,7 @@
                 </a:tc>
                 <a:extLst>
                   <a:ext uri="{0D108BD9-81ED-4DB2-BD59-A6C34878D82A}">
-                    <a16:rowId xmlns="" xmlns:a16="http://schemas.microsoft.com/office/drawing/2014/main" val="10004"/>
+                    <a16:rowId xmlns:a16="http://schemas.microsoft.com/office/drawing/2014/main" xmlns="" val="10004"/>
                   </a:ext>
                 </a:extLst>
               </a:tr>
@@ -8778,7 +8778,7 @@
                 </a:tc>
                 <a:extLst>
                   <a:ext uri="{0D108BD9-81ED-4DB2-BD59-A6C34878D82A}">
-                    <a16:rowId xmlns="" xmlns:a16="http://schemas.microsoft.com/office/drawing/2014/main" val="10005"/>
+                    <a16:rowId xmlns:a16="http://schemas.microsoft.com/office/drawing/2014/main" xmlns="" val="10005"/>
                   </a:ext>
                 </a:extLst>
               </a:tr>
@@ -8864,7 +8864,7 @@
                 </a:tc>
                 <a:extLst>
                   <a:ext uri="{0D108BD9-81ED-4DB2-BD59-A6C34878D82A}">
-                    <a16:rowId xmlns="" xmlns:a16="http://schemas.microsoft.com/office/drawing/2014/main" val="10006"/>
+                    <a16:rowId xmlns:a16="http://schemas.microsoft.com/office/drawing/2014/main" xmlns="" val="10006"/>
                   </a:ext>
                 </a:extLst>
               </a:tr>
@@ -8997,7 +8997,7 @@
                 </a:tc>
                 <a:extLst>
                   <a:ext uri="{0D108BD9-81ED-4DB2-BD59-A6C34878D82A}">
-                    <a16:rowId xmlns="" xmlns:a16="http://schemas.microsoft.com/office/drawing/2014/main" val="10007"/>
+                    <a16:rowId xmlns:a16="http://schemas.microsoft.com/office/drawing/2014/main" xmlns="" val="10007"/>
                   </a:ext>
                 </a:extLst>
               </a:tr>
@@ -9033,7 +9033,7 @@
                 <a:gridCol w="3894455">
                   <a:extLst>
                     <a:ext uri="{9D8B030D-6E8A-4147-A177-3AD203B41FA5}">
-                      <a16:colId xmlns="" xmlns:a16="http://schemas.microsoft.com/office/drawing/2014/main" val="20000"/>
+                      <a16:colId xmlns:a16="http://schemas.microsoft.com/office/drawing/2014/main" xmlns="" val="20000"/>
                     </a:ext>
                   </a:extLst>
                 </a:gridCol>
@@ -9113,7 +9113,7 @@
                 </a:tc>
                 <a:extLst>
                   <a:ext uri="{0D108BD9-81ED-4DB2-BD59-A6C34878D82A}">
-                    <a16:rowId xmlns="" xmlns:a16="http://schemas.microsoft.com/office/drawing/2014/main" val="10000"/>
+                    <a16:rowId xmlns:a16="http://schemas.microsoft.com/office/drawing/2014/main" xmlns="" val="10000"/>
                   </a:ext>
                 </a:extLst>
               </a:tr>
@@ -9206,7 +9206,7 @@
                 </a:tc>
                 <a:extLst>
                   <a:ext uri="{0D108BD9-81ED-4DB2-BD59-A6C34878D82A}">
-                    <a16:rowId xmlns="" xmlns:a16="http://schemas.microsoft.com/office/drawing/2014/main" val="10001"/>
+                    <a16:rowId xmlns:a16="http://schemas.microsoft.com/office/drawing/2014/main" xmlns="" val="10001"/>
                   </a:ext>
                 </a:extLst>
               </a:tr>
@@ -9612,7 +9612,7 @@
                 </a:tc>
                 <a:extLst>
                   <a:ext uri="{0D108BD9-81ED-4DB2-BD59-A6C34878D82A}">
-                    <a16:rowId xmlns="" xmlns:a16="http://schemas.microsoft.com/office/drawing/2014/main" val="10002"/>
+                    <a16:rowId xmlns:a16="http://schemas.microsoft.com/office/drawing/2014/main" xmlns="" val="10002"/>
                   </a:ext>
                 </a:extLst>
               </a:tr>
@@ -9705,7 +9705,7 @@
                 </a:tc>
                 <a:extLst>
                   <a:ext uri="{0D108BD9-81ED-4DB2-BD59-A6C34878D82A}">
-                    <a16:rowId xmlns="" xmlns:a16="http://schemas.microsoft.com/office/drawing/2014/main" val="10003"/>
+                    <a16:rowId xmlns:a16="http://schemas.microsoft.com/office/drawing/2014/main" xmlns="" val="10003"/>
                   </a:ext>
                 </a:extLst>
               </a:tr>
@@ -9838,7 +9838,7 @@
                 </a:tc>
                 <a:extLst>
                   <a:ext uri="{0D108BD9-81ED-4DB2-BD59-A6C34878D82A}">
-                    <a16:rowId xmlns="" xmlns:a16="http://schemas.microsoft.com/office/drawing/2014/main" val="10007"/>
+                    <a16:rowId xmlns:a16="http://schemas.microsoft.com/office/drawing/2014/main" xmlns="" val="10007"/>
                   </a:ext>
                 </a:extLst>
               </a:tr>
@@ -9855,7 +9855,7 @@
           <p:nvPr>
             <p:extLst>
               <p:ext uri="{D42A27DB-BD31-4B8C-83A1-F6EECF244321}">
-                <p14:modId xmlns:p14="http://schemas.microsoft.com/office/powerpoint/2010/main" val="2248994999"/>
+                <p14:modId xmlns:p14="http://schemas.microsoft.com/office/powerpoint/2010/main" val="2149358955"/>
               </p:ext>
             </p:extLst>
           </p:nvPr>
@@ -9874,7 +9874,7 @@
                 <a:gridCol w="3894455">
                   <a:extLst>
                     <a:ext uri="{9D8B030D-6E8A-4147-A177-3AD203B41FA5}">
-                      <a16:colId xmlns="" xmlns:a16="http://schemas.microsoft.com/office/drawing/2014/main" val="20000"/>
+                      <a16:colId xmlns:a16="http://schemas.microsoft.com/office/drawing/2014/main" xmlns="" val="20000"/>
                     </a:ext>
                   </a:extLst>
                 </a:gridCol>
@@ -9954,7 +9954,7 @@
                 </a:tc>
                 <a:extLst>
                   <a:ext uri="{0D108BD9-81ED-4DB2-BD59-A6C34878D82A}">
-                    <a16:rowId xmlns="" xmlns:a16="http://schemas.microsoft.com/office/drawing/2014/main" val="10000"/>
+                    <a16:rowId xmlns:a16="http://schemas.microsoft.com/office/drawing/2014/main" xmlns="" val="10000"/>
                   </a:ext>
                 </a:extLst>
               </a:tr>
@@ -10077,7 +10077,7 @@
                 </a:tc>
                 <a:extLst>
                   <a:ext uri="{0D108BD9-81ED-4DB2-BD59-A6C34878D82A}">
-                    <a16:rowId xmlns="" xmlns:a16="http://schemas.microsoft.com/office/drawing/2014/main" val="10001"/>
+                    <a16:rowId xmlns:a16="http://schemas.microsoft.com/office/drawing/2014/main" xmlns="" val="10001"/>
                   </a:ext>
                 </a:extLst>
               </a:tr>
@@ -10448,7 +10448,359 @@
                 </a:tc>
                 <a:extLst>
                   <a:ext uri="{0D108BD9-81ED-4DB2-BD59-A6C34878D82A}">
-                    <a16:rowId xmlns="" xmlns:a16="http://schemas.microsoft.com/office/drawing/2014/main" val="10007"/>
+                    <a16:rowId xmlns:a16="http://schemas.microsoft.com/office/drawing/2014/main" xmlns="" val="10007"/>
+                  </a:ext>
+                </a:extLst>
+              </a:tr>
+            </a:tbl>
+          </a:graphicData>
+        </a:graphic>
+      </p:graphicFrame>
+      <p:graphicFrame>
+        <p:nvGraphicFramePr>
+          <p:cNvPr id="14" name="Table 13"/>
+          <p:cNvGraphicFramePr>
+            <a:graphicFrameLocks noGrp="1"/>
+          </p:cNvGraphicFramePr>
+          <p:nvPr>
+            <p:extLst>
+              <p:ext uri="{D42A27DB-BD31-4B8C-83A1-F6EECF244321}">
+                <p14:modId xmlns:p14="http://schemas.microsoft.com/office/powerpoint/2010/main" val="2829081725"/>
+              </p:ext>
+            </p:extLst>
+          </p:nvPr>
+        </p:nvGraphicFramePr>
+        <p:xfrm>
+          <a:off x="4684395" y="8470981"/>
+          <a:ext cx="3894455" cy="916940"/>
+        </p:xfrm>
+        <a:graphic>
+          <a:graphicData uri="http://schemas.openxmlformats.org/drawingml/2006/table">
+            <a:tbl>
+              <a:tblPr firstRow="1" bandRow="1">
+                <a:tableStyleId>{5940675A-B579-460E-94D1-54222C63F5DA}</a:tableStyleId>
+              </a:tblPr>
+              <a:tblGrid>
+                <a:gridCol w="3894455">
+                  <a:extLst>
+                    <a:ext uri="{9D8B030D-6E8A-4147-A177-3AD203B41FA5}">
+                      <a16:colId xmlns:a16="http://schemas.microsoft.com/office/drawing/2014/main" xmlns="" val="20000"/>
+                    </a:ext>
+                  </a:extLst>
+                </a:gridCol>
+              </a:tblGrid>
+              <a:tr h="260350">
+                <a:tc>
+                  <a:txBody>
+                    <a:bodyPr/>
+                    <a:lstStyle/>
+                    <a:p>
+                      <a:pPr algn="l"/>
+                      <a:r>
+                        <a:rPr lang="en-GB" sz="1000" b="1" baseline="0" smtClean="0">
+                          <a:solidFill>
+                            <a:srgbClr val="000000"/>
+                          </a:solidFill>
+                          <a:latin typeface="Segoe UI" pitchFamily="34" charset="0"/>
+                          <a:cs typeface="Segoe UI" pitchFamily="34" charset="0"/>
+                        </a:rPr>
+                        <a:t>Don’t Use External Benchmark</a:t>
+                      </a:r>
+                      <a:endParaRPr lang="en-GB" sz="1000" b="1" baseline="0">
+                        <a:solidFill>
+                          <a:srgbClr val="000000"/>
+                        </a:solidFill>
+                        <a:latin typeface="Segoe UI" pitchFamily="34" charset="0"/>
+                        <a:cs typeface="Segoe UI" pitchFamily="34" charset="0"/>
+                      </a:endParaRPr>
+                    </a:p>
+                  </a:txBody>
+                  <a:tcPr>
+                    <a:lnL w="6350" cap="flat" cmpd="sng" algn="ctr">
+                      <a:solidFill>
+                        <a:srgbClr val="000000"/>
+                      </a:solidFill>
+                      <a:prstDash val="solid"/>
+                      <a:round/>
+                      <a:headEnd type="none" w="med" len="med"/>
+                      <a:tailEnd type="none" w="med" len="med"/>
+                    </a:lnL>
+                    <a:lnR w="12700" cap="flat" cmpd="sng" algn="ctr">
+                      <a:solidFill>
+                        <a:schemeClr val="tx1"/>
+                      </a:solidFill>
+                      <a:prstDash val="solid"/>
+                      <a:round/>
+                      <a:headEnd type="none" w="med" len="med"/>
+                      <a:tailEnd type="none" w="med" len="med"/>
+                    </a:lnR>
+                    <a:lnT w="6350" cap="flat" cmpd="sng" algn="ctr">
+                      <a:solidFill>
+                        <a:srgbClr val="000000"/>
+                      </a:solidFill>
+                      <a:prstDash val="solid"/>
+                      <a:round/>
+                      <a:headEnd type="none" w="med" len="med"/>
+                      <a:tailEnd type="none" w="med" len="med"/>
+                    </a:lnT>
+                    <a:lnB w="6350" cap="flat" cmpd="sng" algn="ctr">
+                      <a:solidFill>
+                        <a:srgbClr val="000000"/>
+                      </a:solidFill>
+                      <a:prstDash val="solid"/>
+                      <a:round/>
+                      <a:headEnd type="none" w="med" len="med"/>
+                      <a:tailEnd type="none" w="med" len="med"/>
+                    </a:lnB>
+                    <a:lnTlToBr w="12700" cmpd="sng">
+                      <a:noFill/>
+                      <a:prstDash val="solid"/>
+                    </a:lnTlToBr>
+                    <a:lnBlToTr w="12700" cmpd="sng">
+                      <a:noFill/>
+                      <a:prstDash val="solid"/>
+                    </a:lnBlToTr>
+                  </a:tcPr>
+                </a:tc>
+                <a:extLst>
+                  <a:ext uri="{0D108BD9-81ED-4DB2-BD59-A6C34878D82A}">
+                    <a16:rowId xmlns:a16="http://schemas.microsoft.com/office/drawing/2014/main" xmlns="" val="10000"/>
+                  </a:ext>
+                </a:extLst>
+              </a:tr>
+              <a:tr h="273736">
+                <a:tc>
+                  <a:txBody>
+                    <a:bodyPr/>
+                    <a:lstStyle/>
+                    <a:p>
+                      <a:pPr marL="0" marR="0" indent="0" algn="l" defTabSz="584200" rtl="0" eaLnBrk="1" fontAlgn="auto" latinLnBrk="0" hangingPunct="1">
+                        <a:lnSpc>
+                          <a:spcPct val="100000"/>
+                        </a:lnSpc>
+                        <a:spcBef>
+                          <a:spcPts val="0"/>
+                        </a:spcBef>
+                        <a:spcAft>
+                          <a:spcPts val="0"/>
+                        </a:spcAft>
+                        <a:buClrTx/>
+                        <a:buSzTx/>
+                        <a:buFontTx/>
+                        <a:buNone/>
+                        <a:tabLst/>
+                        <a:defRPr/>
+                      </a:pPr>
+                      <a:r>
+                        <a:rPr lang="en-GB" sz="1000" i="0" smtClean="0">
+                          <a:solidFill>
+                            <a:srgbClr val="000000"/>
+                          </a:solidFill>
+                          <a:latin typeface="Segoe UI" pitchFamily="34" charset="0"/>
+                          <a:cs typeface="Segoe UI" pitchFamily="34" charset="0"/>
+                        </a:rPr>
+                        <a:t>External</a:t>
+                      </a:r>
+                      <a:r>
+                        <a:rPr lang="en-GB" sz="1000" i="0" baseline="0" smtClean="0">
+                          <a:solidFill>
+                            <a:srgbClr val="000000"/>
+                          </a:solidFill>
+                          <a:latin typeface="Segoe UI" pitchFamily="34" charset="0"/>
+                          <a:cs typeface="Segoe UI" pitchFamily="34" charset="0"/>
+                        </a:rPr>
+                        <a:t> benchmarks for forecasting accuracy are very unreliable! Do not use them.</a:t>
+                      </a:r>
+                      <a:endParaRPr lang="en-GB" sz="1000" i="0">
+                        <a:solidFill>
+                          <a:srgbClr val="000000"/>
+                        </a:solidFill>
+                        <a:latin typeface="Segoe UI" pitchFamily="34" charset="0"/>
+                        <a:cs typeface="Segoe UI" pitchFamily="34" charset="0"/>
+                      </a:endParaRPr>
+                    </a:p>
+                  </a:txBody>
+                  <a:tcPr>
+                    <a:lnL w="6350" cap="flat" cmpd="sng" algn="ctr">
+                      <a:solidFill>
+                        <a:srgbClr val="000000"/>
+                      </a:solidFill>
+                      <a:prstDash val="solid"/>
+                      <a:round/>
+                      <a:headEnd type="none" w="med" len="med"/>
+                      <a:tailEnd type="none" w="med" len="med"/>
+                    </a:lnL>
+                    <a:lnR w="12700" cap="flat" cmpd="sng" algn="ctr">
+                      <a:solidFill>
+                        <a:schemeClr val="tx1"/>
+                      </a:solidFill>
+                      <a:prstDash val="solid"/>
+                      <a:round/>
+                      <a:headEnd type="none" w="med" len="med"/>
+                      <a:tailEnd type="none" w="med" len="med"/>
+                    </a:lnR>
+                    <a:lnT w="6350" cap="flat" cmpd="sng" algn="ctr">
+                      <a:solidFill>
+                        <a:srgbClr val="000000"/>
+                      </a:solidFill>
+                      <a:prstDash val="solid"/>
+                      <a:round/>
+                      <a:headEnd type="none" w="med" len="med"/>
+                      <a:tailEnd type="none" w="med" len="med"/>
+                    </a:lnT>
+                    <a:lnB w="6350" cap="flat" cmpd="sng" algn="ctr">
+                      <a:noFill/>
+                      <a:prstDash val="solid"/>
+                      <a:round/>
+                      <a:headEnd type="none" w="med" len="med"/>
+                      <a:tailEnd type="none" w="med" len="med"/>
+                    </a:lnB>
+                    <a:lnTlToBr w="12700" cmpd="sng">
+                      <a:noFill/>
+                      <a:prstDash val="solid"/>
+                    </a:lnTlToBr>
+                    <a:lnBlToTr w="12700" cmpd="sng">
+                      <a:noFill/>
+                      <a:prstDash val="solid"/>
+                    </a:lnBlToTr>
+                  </a:tcPr>
+                </a:tc>
+                <a:extLst>
+                  <a:ext uri="{0D108BD9-81ED-4DB2-BD59-A6C34878D82A}">
+                    <a16:rowId xmlns:a16="http://schemas.microsoft.com/office/drawing/2014/main" xmlns="" val="10001"/>
+                  </a:ext>
+                </a:extLst>
+              </a:tr>
+              <a:tr h="260350">
+                <a:tc>
+                  <a:txBody>
+                    <a:bodyPr/>
+                    <a:lstStyle/>
+                    <a:p>
+                      <a:pPr marL="0" marR="0" indent="0" algn="l" defTabSz="584200" rtl="0" eaLnBrk="1" fontAlgn="auto" latinLnBrk="0" hangingPunct="1">
+                        <a:lnSpc>
+                          <a:spcPct val="100000"/>
+                        </a:lnSpc>
+                        <a:spcBef>
+                          <a:spcPts val="0"/>
+                        </a:spcBef>
+                        <a:spcAft>
+                          <a:spcPts val="0"/>
+                        </a:spcAft>
+                        <a:buClrTx/>
+                        <a:buSzTx/>
+                        <a:buFontTx/>
+                        <a:buNone/>
+                        <a:tabLst/>
+                        <a:defRPr/>
+                      </a:pPr>
+                      <a:r>
+                        <a:rPr lang="en-GB" sz="1000" b="0" i="0" u="none" strike="noStrike" cap="none" spc="0" baseline="0">
+                          <a:ln>
+                            <a:noFill/>
+                          </a:ln>
+                          <a:solidFill>
+                            <a:srgbClr val="000000"/>
+                          </a:solidFill>
+                          <a:uFillTx/>
+                          <a:latin typeface="Segoe UI" pitchFamily="34" charset="0"/>
+                          <a:ea typeface="+mn-ea"/>
+                          <a:cs typeface="Segoe UI" pitchFamily="34" charset="0"/>
+                          <a:sym typeface="Source Sans Pro"/>
+                        </a:rPr>
+                        <a:t>Source: </a:t>
+                      </a:r>
+                      <a:r>
+                        <a:rPr lang="en-GB" sz="1000" b="0" i="0" u="none" strike="noStrike" cap="none" spc="0" baseline="0">
+                          <a:ln>
+                            <a:noFill/>
+                          </a:ln>
+                          <a:solidFill>
+                            <a:srgbClr val="000000"/>
+                          </a:solidFill>
+                          <a:uFillTx/>
+                          <a:latin typeface="Segoe UI" pitchFamily="34" charset="0"/>
+                          <a:ea typeface="+mn-ea"/>
+                          <a:cs typeface="Segoe UI" pitchFamily="34" charset="0"/>
+                          <a:sym typeface="Helvetica Light"/>
+                        </a:rPr>
+                        <a:t>Business Forecasting Ch. </a:t>
+                      </a:r>
+                      <a:r>
+                        <a:rPr lang="en-GB" sz="1000" b="0" i="0" u="none" strike="noStrike" cap="none" spc="0" baseline="0" smtClean="0">
+                          <a:ln>
+                            <a:noFill/>
+                          </a:ln>
+                          <a:solidFill>
+                            <a:srgbClr val="000000"/>
+                          </a:solidFill>
+                          <a:uFillTx/>
+                          <a:latin typeface="Segoe UI" pitchFamily="34" charset="0"/>
+                          <a:ea typeface="+mn-ea"/>
+                          <a:cs typeface="Segoe UI" pitchFamily="34" charset="0"/>
+                          <a:sym typeface="Helvetica Light"/>
+                        </a:rPr>
+                        <a:t>1.6-1.7</a:t>
+                      </a:r>
+                      <a:endParaRPr lang="en-GB" sz="1000" b="0" i="0" u="none" strike="noStrike" cap="none" spc="0" baseline="0">
+                        <a:ln>
+                          <a:noFill/>
+                        </a:ln>
+                        <a:solidFill>
+                          <a:srgbClr val="000000"/>
+                        </a:solidFill>
+                        <a:uFillTx/>
+                        <a:latin typeface="Segoe UI" pitchFamily="34" charset="0"/>
+                        <a:ea typeface="+mn-ea"/>
+                        <a:cs typeface="Segoe UI" pitchFamily="34" charset="0"/>
+                        <a:sym typeface="Source Sans Pro"/>
+                      </a:endParaRPr>
+                    </a:p>
+                  </a:txBody>
+                  <a:tcPr>
+                    <a:lnL w="6350" cap="flat" cmpd="sng" algn="ctr">
+                      <a:solidFill>
+                        <a:srgbClr val="000000"/>
+                      </a:solidFill>
+                      <a:prstDash val="solid"/>
+                      <a:round/>
+                      <a:headEnd type="none" w="med" len="med"/>
+                      <a:tailEnd type="none" w="med" len="med"/>
+                    </a:lnL>
+                    <a:lnR w="12700" cap="flat" cmpd="sng" algn="ctr">
+                      <a:solidFill>
+                        <a:schemeClr val="tx1"/>
+                      </a:solidFill>
+                      <a:prstDash val="solid"/>
+                      <a:round/>
+                      <a:headEnd type="none" w="med" len="med"/>
+                      <a:tailEnd type="none" w="med" len="med"/>
+                    </a:lnR>
+                    <a:lnT w="12700" cmpd="sng">
+                      <a:noFill/>
+                    </a:lnT>
+                    <a:lnB w="6350" cap="flat" cmpd="sng" algn="ctr">
+                      <a:solidFill>
+                        <a:srgbClr val="000000"/>
+                      </a:solidFill>
+                      <a:prstDash val="solid"/>
+                      <a:round/>
+                      <a:headEnd type="none" w="med" len="med"/>
+                      <a:tailEnd type="none" w="med" len="med"/>
+                    </a:lnB>
+                    <a:lnTlToBr w="12700" cmpd="sng">
+                      <a:noFill/>
+                      <a:prstDash val="solid"/>
+                    </a:lnTlToBr>
+                    <a:lnBlToTr w="12700" cmpd="sng">
+                      <a:noFill/>
+                      <a:prstDash val="solid"/>
+                    </a:lnBlToTr>
+                  </a:tcPr>
+                </a:tc>
+                <a:extLst>
+                  <a:ext uri="{0D108BD9-81ED-4DB2-BD59-A6C34878D82A}">
+                    <a16:rowId xmlns:a16="http://schemas.microsoft.com/office/drawing/2014/main" xmlns="" val="10007"/>
                   </a:ext>
                 </a:extLst>
               </a:tr>
@@ -10768,7 +11120,7 @@
                 <a:gridCol w="3800476">
                   <a:extLst>
                     <a:ext uri="{9D8B030D-6E8A-4147-A177-3AD203B41FA5}">
-                      <a16:colId xmlns="" xmlns:a16="http://schemas.microsoft.com/office/drawing/2014/main" val="20000"/>
+                      <a16:colId xmlns:a16="http://schemas.microsoft.com/office/drawing/2014/main" xmlns="" val="20000"/>
                     </a:ext>
                   </a:extLst>
                 </a:gridCol>
@@ -10848,7 +11200,7 @@
                 </a:tc>
                 <a:extLst>
                   <a:ext uri="{0D108BD9-81ED-4DB2-BD59-A6C34878D82A}">
-                    <a16:rowId xmlns="" xmlns:a16="http://schemas.microsoft.com/office/drawing/2014/main" val="10000"/>
+                    <a16:rowId xmlns:a16="http://schemas.microsoft.com/office/drawing/2014/main" xmlns="" val="10000"/>
                   </a:ext>
                 </a:extLst>
               </a:tr>
@@ -10928,7 +11280,7 @@
                 </a:tc>
                 <a:extLst>
                   <a:ext uri="{0D108BD9-81ED-4DB2-BD59-A6C34878D82A}">
-                    <a16:rowId xmlns="" xmlns:a16="http://schemas.microsoft.com/office/drawing/2014/main" val="10001"/>
+                    <a16:rowId xmlns:a16="http://schemas.microsoft.com/office/drawing/2014/main" xmlns="" val="10001"/>
                   </a:ext>
                 </a:extLst>
               </a:tr>
@@ -10982,7 +11334,7 @@
                 </a:tc>
                 <a:extLst>
                   <a:ext uri="{0D108BD9-81ED-4DB2-BD59-A6C34878D82A}">
-                    <a16:rowId xmlns="" xmlns:a16="http://schemas.microsoft.com/office/drawing/2014/main" val="10002"/>
+                    <a16:rowId xmlns:a16="http://schemas.microsoft.com/office/drawing/2014/main" xmlns="" val="10002"/>
                   </a:ext>
                 </a:extLst>
               </a:tr>
@@ -11036,7 +11388,7 @@
                 </a:tc>
                 <a:extLst>
                   <a:ext uri="{0D108BD9-81ED-4DB2-BD59-A6C34878D82A}">
-                    <a16:rowId xmlns="" xmlns:a16="http://schemas.microsoft.com/office/drawing/2014/main" val="10003"/>
+                    <a16:rowId xmlns:a16="http://schemas.microsoft.com/office/drawing/2014/main" xmlns="" val="10003"/>
                   </a:ext>
                 </a:extLst>
               </a:tr>
@@ -11118,7 +11470,7 @@
                 </a:tc>
                 <a:extLst>
                   <a:ext uri="{0D108BD9-81ED-4DB2-BD59-A6C34878D82A}">
-                    <a16:rowId xmlns="" xmlns:a16="http://schemas.microsoft.com/office/drawing/2014/main" val="10004"/>
+                    <a16:rowId xmlns:a16="http://schemas.microsoft.com/office/drawing/2014/main" xmlns="" val="10004"/>
                   </a:ext>
                 </a:extLst>
               </a:tr>
@@ -11154,7 +11506,7 @@
                 <a:gridCol w="3825875">
                   <a:extLst>
                     <a:ext uri="{9D8B030D-6E8A-4147-A177-3AD203B41FA5}">
-                      <a16:colId xmlns="" xmlns:a16="http://schemas.microsoft.com/office/drawing/2014/main" val="20000"/>
+                      <a16:colId xmlns:a16="http://schemas.microsoft.com/office/drawing/2014/main" xmlns="" val="20000"/>
                     </a:ext>
                   </a:extLst>
                 </a:gridCol>
@@ -11247,7 +11599,7 @@
                 </a:tc>
                 <a:extLst>
                   <a:ext uri="{0D108BD9-81ED-4DB2-BD59-A6C34878D82A}">
-                    <a16:rowId xmlns="" xmlns:a16="http://schemas.microsoft.com/office/drawing/2014/main" val="10000"/>
+                    <a16:rowId xmlns:a16="http://schemas.microsoft.com/office/drawing/2014/main" xmlns="" val="10000"/>
                   </a:ext>
                 </a:extLst>
               </a:tr>
@@ -11347,7 +11699,7 @@
                 </a:tc>
                 <a:extLst>
                   <a:ext uri="{0D108BD9-81ED-4DB2-BD59-A6C34878D82A}">
-                    <a16:rowId xmlns="" xmlns:a16="http://schemas.microsoft.com/office/drawing/2014/main" val="10001"/>
+                    <a16:rowId xmlns:a16="http://schemas.microsoft.com/office/drawing/2014/main" xmlns="" val="10001"/>
                   </a:ext>
                 </a:extLst>
               </a:tr>
@@ -11443,7 +11795,7 @@
                 </a:tc>
                 <a:extLst>
                   <a:ext uri="{0D108BD9-81ED-4DB2-BD59-A6C34878D82A}">
-                    <a16:rowId xmlns="" xmlns:a16="http://schemas.microsoft.com/office/drawing/2014/main" val="10002"/>
+                    <a16:rowId xmlns:a16="http://schemas.microsoft.com/office/drawing/2014/main" xmlns="" val="10002"/>
                   </a:ext>
                 </a:extLst>
               </a:tr>
@@ -11715,7 +12067,7 @@
                 </a:tc>
                 <a:extLst>
                   <a:ext uri="{0D108BD9-81ED-4DB2-BD59-A6C34878D82A}">
-                    <a16:rowId xmlns="" xmlns:a16="http://schemas.microsoft.com/office/drawing/2014/main" val="10003"/>
+                    <a16:rowId xmlns:a16="http://schemas.microsoft.com/office/drawing/2014/main" xmlns="" val="10003"/>
                   </a:ext>
                 </a:extLst>
               </a:tr>
@@ -11816,7 +12168,7 @@
                 </a:tc>
                 <a:extLst>
                   <a:ext uri="{0D108BD9-81ED-4DB2-BD59-A6C34878D82A}">
-                    <a16:rowId xmlns="" xmlns:a16="http://schemas.microsoft.com/office/drawing/2014/main" val="10004"/>
+                    <a16:rowId xmlns:a16="http://schemas.microsoft.com/office/drawing/2014/main" xmlns="" val="10004"/>
                   </a:ext>
                 </a:extLst>
               </a:tr>
@@ -11852,7 +12204,7 @@
                 <a:gridCol w="3825875">
                   <a:extLst>
                     <a:ext uri="{9D8B030D-6E8A-4147-A177-3AD203B41FA5}">
-                      <a16:colId xmlns="" xmlns:a16="http://schemas.microsoft.com/office/drawing/2014/main" val="20000"/>
+                      <a16:colId xmlns:a16="http://schemas.microsoft.com/office/drawing/2014/main" xmlns="" val="20000"/>
                     </a:ext>
                   </a:extLst>
                 </a:gridCol>
@@ -11925,7 +12277,7 @@
                 </a:tc>
                 <a:extLst>
                   <a:ext uri="{0D108BD9-81ED-4DB2-BD59-A6C34878D82A}">
-                    <a16:rowId xmlns="" xmlns:a16="http://schemas.microsoft.com/office/drawing/2014/main" val="10000"/>
+                    <a16:rowId xmlns:a16="http://schemas.microsoft.com/office/drawing/2014/main" xmlns="" val="10000"/>
                   </a:ext>
                 </a:extLst>
               </a:tr>
@@ -12005,7 +12357,7 @@
                 </a:tc>
                 <a:extLst>
                   <a:ext uri="{0D108BD9-81ED-4DB2-BD59-A6C34878D82A}">
-                    <a16:rowId xmlns="" xmlns:a16="http://schemas.microsoft.com/office/drawing/2014/main" val="10001"/>
+                    <a16:rowId xmlns:a16="http://schemas.microsoft.com/office/drawing/2014/main" xmlns="" val="10001"/>
                   </a:ext>
                 </a:extLst>
               </a:tr>
@@ -12085,7 +12437,7 @@
                 </a:tc>
                 <a:extLst>
                   <a:ext uri="{0D108BD9-81ED-4DB2-BD59-A6C34878D82A}">
-                    <a16:rowId xmlns="" xmlns:a16="http://schemas.microsoft.com/office/drawing/2014/main" val="10002"/>
+                    <a16:rowId xmlns:a16="http://schemas.microsoft.com/office/drawing/2014/main" xmlns="" val="10002"/>
                   </a:ext>
                 </a:extLst>
               </a:tr>
@@ -12165,7 +12517,7 @@
                 </a:tc>
                 <a:extLst>
                   <a:ext uri="{0D108BD9-81ED-4DB2-BD59-A6C34878D82A}">
-                    <a16:rowId xmlns="" xmlns:a16="http://schemas.microsoft.com/office/drawing/2014/main" val="10003"/>
+                    <a16:rowId xmlns:a16="http://schemas.microsoft.com/office/drawing/2014/main" xmlns="" val="10003"/>
                   </a:ext>
                 </a:extLst>
               </a:tr>
@@ -12245,7 +12597,7 @@
                 </a:tc>
                 <a:extLst>
                   <a:ext uri="{0D108BD9-81ED-4DB2-BD59-A6C34878D82A}">
-                    <a16:rowId xmlns="" xmlns:a16="http://schemas.microsoft.com/office/drawing/2014/main" val="10004"/>
+                    <a16:rowId xmlns:a16="http://schemas.microsoft.com/office/drawing/2014/main" xmlns="" val="10004"/>
                   </a:ext>
                 </a:extLst>
               </a:tr>
@@ -12324,7 +12676,7 @@
                 </a:tc>
                 <a:extLst>
                   <a:ext uri="{0D108BD9-81ED-4DB2-BD59-A6C34878D82A}">
-                    <a16:rowId xmlns="" xmlns:a16="http://schemas.microsoft.com/office/drawing/2014/main" val="10005"/>
+                    <a16:rowId xmlns:a16="http://schemas.microsoft.com/office/drawing/2014/main" xmlns="" val="10005"/>
                   </a:ext>
                 </a:extLst>
               </a:tr>
@@ -12360,21 +12712,21 @@
                 <a:gridCol w="1333954">
                   <a:extLst>
                     <a:ext uri="{9D8B030D-6E8A-4147-A177-3AD203B41FA5}">
-                      <a16:colId xmlns="" xmlns:a16="http://schemas.microsoft.com/office/drawing/2014/main" val="20000"/>
+                      <a16:colId xmlns:a16="http://schemas.microsoft.com/office/drawing/2014/main" xmlns="" val="20000"/>
                     </a:ext>
                   </a:extLst>
                 </a:gridCol>
                 <a:gridCol w="380538">
                   <a:extLst>
                     <a:ext uri="{9D8B030D-6E8A-4147-A177-3AD203B41FA5}">
-                      <a16:colId xmlns="" xmlns:a16="http://schemas.microsoft.com/office/drawing/2014/main" val="20001"/>
+                      <a16:colId xmlns:a16="http://schemas.microsoft.com/office/drawing/2014/main" xmlns="" val="20001"/>
                     </a:ext>
                   </a:extLst>
                 </a:gridCol>
                 <a:gridCol w="1831568">
                   <a:extLst>
                     <a:ext uri="{9D8B030D-6E8A-4147-A177-3AD203B41FA5}">
-                      <a16:colId xmlns="" xmlns:a16="http://schemas.microsoft.com/office/drawing/2014/main" val="20002"/>
+                      <a16:colId xmlns:a16="http://schemas.microsoft.com/office/drawing/2014/main" xmlns="" val="20002"/>
                     </a:ext>
                   </a:extLst>
                 </a:gridCol>
@@ -12482,7 +12834,7 @@
                 </a:tc>
                 <a:extLst>
                   <a:ext uri="{0D108BD9-81ED-4DB2-BD59-A6C34878D82A}">
-                    <a16:rowId xmlns="" xmlns:a16="http://schemas.microsoft.com/office/drawing/2014/main" val="10000"/>
+                    <a16:rowId xmlns:a16="http://schemas.microsoft.com/office/drawing/2014/main" xmlns="" val="10000"/>
                   </a:ext>
                 </a:extLst>
               </a:tr>
@@ -12684,7 +13036,7 @@
                 </a:tc>
                 <a:extLst>
                   <a:ext uri="{0D108BD9-81ED-4DB2-BD59-A6C34878D82A}">
-                    <a16:rowId xmlns="" xmlns:a16="http://schemas.microsoft.com/office/drawing/2014/main" val="10001"/>
+                    <a16:rowId xmlns:a16="http://schemas.microsoft.com/office/drawing/2014/main" xmlns="" val="10001"/>
                   </a:ext>
                 </a:extLst>
               </a:tr>
@@ -12817,7 +13169,7 @@
                 </a:tc>
                 <a:extLst>
                   <a:ext uri="{0D108BD9-81ED-4DB2-BD59-A6C34878D82A}">
-                    <a16:rowId xmlns="" xmlns:a16="http://schemas.microsoft.com/office/drawing/2014/main" val="10002"/>
+                    <a16:rowId xmlns:a16="http://schemas.microsoft.com/office/drawing/2014/main" xmlns="" val="10002"/>
                   </a:ext>
                 </a:extLst>
               </a:tr>
@@ -12950,7 +13302,7 @@
                 </a:tc>
                 <a:extLst>
                   <a:ext uri="{0D108BD9-81ED-4DB2-BD59-A6C34878D82A}">
-                    <a16:rowId xmlns="" xmlns:a16="http://schemas.microsoft.com/office/drawing/2014/main" val="10003"/>
+                    <a16:rowId xmlns:a16="http://schemas.microsoft.com/office/drawing/2014/main" xmlns="" val="10003"/>
                   </a:ext>
                 </a:extLst>
               </a:tr>
@@ -13167,7 +13519,7 @@
                 </a:tc>
                 <a:extLst>
                   <a:ext uri="{0D108BD9-81ED-4DB2-BD59-A6C34878D82A}">
-                    <a16:rowId xmlns="" xmlns:a16="http://schemas.microsoft.com/office/drawing/2014/main" val="10004"/>
+                    <a16:rowId xmlns:a16="http://schemas.microsoft.com/office/drawing/2014/main" xmlns="" val="10004"/>
                   </a:ext>
                 </a:extLst>
               </a:tr>
@@ -13203,7 +13555,7 @@
                 <a:gridCol w="3800476">
                   <a:extLst>
                     <a:ext uri="{9D8B030D-6E8A-4147-A177-3AD203B41FA5}">
-                      <a16:colId xmlns="" xmlns:a16="http://schemas.microsoft.com/office/drawing/2014/main" val="20000"/>
+                      <a16:colId xmlns:a16="http://schemas.microsoft.com/office/drawing/2014/main" xmlns="" val="20000"/>
                     </a:ext>
                   </a:extLst>
                 </a:gridCol>
@@ -13283,7 +13635,7 @@
                 </a:tc>
                 <a:extLst>
                   <a:ext uri="{0D108BD9-81ED-4DB2-BD59-A6C34878D82A}">
-                    <a16:rowId xmlns="" xmlns:a16="http://schemas.microsoft.com/office/drawing/2014/main" val="10000"/>
+                    <a16:rowId xmlns:a16="http://schemas.microsoft.com/office/drawing/2014/main" xmlns="" val="10000"/>
                   </a:ext>
                 </a:extLst>
               </a:tr>
@@ -13383,7 +13735,7 @@
                 </a:tc>
                 <a:extLst>
                   <a:ext uri="{0D108BD9-81ED-4DB2-BD59-A6C34878D82A}">
-                    <a16:rowId xmlns="" xmlns:a16="http://schemas.microsoft.com/office/drawing/2014/main" val="10001"/>
+                    <a16:rowId xmlns:a16="http://schemas.microsoft.com/office/drawing/2014/main" xmlns="" val="10001"/>
                   </a:ext>
                 </a:extLst>
               </a:tr>
@@ -13492,7 +13844,7 @@
                 </a:tc>
                 <a:extLst>
                   <a:ext uri="{0D108BD9-81ED-4DB2-BD59-A6C34878D82A}">
-                    <a16:rowId xmlns="" xmlns:a16="http://schemas.microsoft.com/office/drawing/2014/main" val="10002"/>
+                    <a16:rowId xmlns:a16="http://schemas.microsoft.com/office/drawing/2014/main" xmlns="" val="10002"/>
                   </a:ext>
                 </a:extLst>
               </a:tr>
@@ -13809,7 +14161,7 @@
                 </a:tc>
                 <a:extLst>
                   <a:ext uri="{0D108BD9-81ED-4DB2-BD59-A6C34878D82A}">
-                    <a16:rowId xmlns="" xmlns:a16="http://schemas.microsoft.com/office/drawing/2014/main" val="10003"/>
+                    <a16:rowId xmlns:a16="http://schemas.microsoft.com/office/drawing/2014/main" xmlns="" val="10003"/>
                   </a:ext>
                 </a:extLst>
               </a:tr>
@@ -13921,7 +14273,7 @@
                 </a:tc>
                 <a:extLst>
                   <a:ext uri="{0D108BD9-81ED-4DB2-BD59-A6C34878D82A}">
-                    <a16:rowId xmlns="" xmlns:a16="http://schemas.microsoft.com/office/drawing/2014/main" val="10004"/>
+                    <a16:rowId xmlns:a16="http://schemas.microsoft.com/office/drawing/2014/main" xmlns="" val="10004"/>
                   </a:ext>
                 </a:extLst>
               </a:tr>
@@ -14081,7 +14433,7 @@
                 </a:tc>
                 <a:extLst>
                   <a:ext uri="{0D108BD9-81ED-4DB2-BD59-A6C34878D82A}">
-                    <a16:rowId xmlns="" xmlns:a16="http://schemas.microsoft.com/office/drawing/2014/main" val="10005"/>
+                    <a16:rowId xmlns:a16="http://schemas.microsoft.com/office/drawing/2014/main" xmlns="" val="10005"/>
                   </a:ext>
                 </a:extLst>
               </a:tr>
@@ -14209,7 +14561,7 @@
                 </a:tc>
                 <a:extLst>
                   <a:ext uri="{0D108BD9-81ED-4DB2-BD59-A6C34878D82A}">
-                    <a16:rowId xmlns="" xmlns:a16="http://schemas.microsoft.com/office/drawing/2014/main" val="10006"/>
+                    <a16:rowId xmlns:a16="http://schemas.microsoft.com/office/drawing/2014/main" xmlns="" val="10006"/>
                   </a:ext>
                 </a:extLst>
               </a:tr>
@@ -14286,7 +14638,7 @@
                 </a:tc>
                 <a:extLst>
                   <a:ext uri="{0D108BD9-81ED-4DB2-BD59-A6C34878D82A}">
-                    <a16:rowId xmlns="" xmlns:a16="http://schemas.microsoft.com/office/drawing/2014/main" val="10007"/>
+                    <a16:rowId xmlns:a16="http://schemas.microsoft.com/office/drawing/2014/main" xmlns="" val="10007"/>
                   </a:ext>
                 </a:extLst>
               </a:tr>
@@ -14368,7 +14720,7 @@
                 </a:tc>
                 <a:extLst>
                   <a:ext uri="{0D108BD9-81ED-4DB2-BD59-A6C34878D82A}">
-                    <a16:rowId xmlns="" xmlns:a16="http://schemas.microsoft.com/office/drawing/2014/main" val="10008"/>
+                    <a16:rowId xmlns:a16="http://schemas.microsoft.com/office/drawing/2014/main" xmlns="" val="10008"/>
                   </a:ext>
                 </a:extLst>
               </a:tr>
@@ -14404,7 +14756,7 @@
                 <a:gridCol w="3970655">
                   <a:extLst>
                     <a:ext uri="{9D8B030D-6E8A-4147-A177-3AD203B41FA5}">
-                      <a16:colId xmlns="" xmlns:a16="http://schemas.microsoft.com/office/drawing/2014/main" val="20000"/>
+                      <a16:colId xmlns:a16="http://schemas.microsoft.com/office/drawing/2014/main" xmlns="" val="20000"/>
                     </a:ext>
                   </a:extLst>
                 </a:gridCol>
@@ -14477,7 +14829,7 @@
                 </a:tc>
                 <a:extLst>
                   <a:ext uri="{0D108BD9-81ED-4DB2-BD59-A6C34878D82A}">
-                    <a16:rowId xmlns="" xmlns:a16="http://schemas.microsoft.com/office/drawing/2014/main" val="10000"/>
+                    <a16:rowId xmlns:a16="http://schemas.microsoft.com/office/drawing/2014/main" xmlns="" val="10000"/>
                   </a:ext>
                 </a:extLst>
               </a:tr>
@@ -14563,7 +14915,7 @@
                 </a:tc>
                 <a:extLst>
                   <a:ext uri="{0D108BD9-81ED-4DB2-BD59-A6C34878D82A}">
-                    <a16:rowId xmlns="" xmlns:a16="http://schemas.microsoft.com/office/drawing/2014/main" val="10001"/>
+                    <a16:rowId xmlns:a16="http://schemas.microsoft.com/office/drawing/2014/main" xmlns="" val="10001"/>
                   </a:ext>
                 </a:extLst>
               </a:tr>
@@ -14681,7 +15033,7 @@
                 </a:tc>
                 <a:extLst>
                   <a:ext uri="{0D108BD9-81ED-4DB2-BD59-A6C34878D82A}">
-                    <a16:rowId xmlns="" xmlns:a16="http://schemas.microsoft.com/office/drawing/2014/main" val="10002"/>
+                    <a16:rowId xmlns:a16="http://schemas.microsoft.com/office/drawing/2014/main" xmlns="" val="10002"/>
                   </a:ext>
                 </a:extLst>
               </a:tr>
@@ -14784,7 +15136,7 @@
                 </a:tc>
                 <a:extLst>
                   <a:ext uri="{0D108BD9-81ED-4DB2-BD59-A6C34878D82A}">
-                    <a16:rowId xmlns="" xmlns:a16="http://schemas.microsoft.com/office/drawing/2014/main" val="10003"/>
+                    <a16:rowId xmlns:a16="http://schemas.microsoft.com/office/drawing/2014/main" xmlns="" val="10003"/>
                   </a:ext>
                 </a:extLst>
               </a:tr>
@@ -14877,7 +15229,7 @@
                 </a:tc>
                 <a:extLst>
                   <a:ext uri="{0D108BD9-81ED-4DB2-BD59-A6C34878D82A}">
-                    <a16:rowId xmlns="" xmlns:a16="http://schemas.microsoft.com/office/drawing/2014/main" val="10004"/>
+                    <a16:rowId xmlns:a16="http://schemas.microsoft.com/office/drawing/2014/main" xmlns="" val="10004"/>
                   </a:ext>
                 </a:extLst>
               </a:tr>
@@ -14974,7 +15326,7 @@
                 </a:tc>
                 <a:extLst>
                   <a:ext uri="{0D108BD9-81ED-4DB2-BD59-A6C34878D82A}">
-                    <a16:rowId xmlns="" xmlns:a16="http://schemas.microsoft.com/office/drawing/2014/main" val="10005"/>
+                    <a16:rowId xmlns:a16="http://schemas.microsoft.com/office/drawing/2014/main" xmlns="" val="10005"/>
                   </a:ext>
                 </a:extLst>
               </a:tr>
@@ -15057,7 +15409,7 @@
                 </a:tc>
                 <a:extLst>
                   <a:ext uri="{0D108BD9-81ED-4DB2-BD59-A6C34878D82A}">
-                    <a16:rowId xmlns="" xmlns:a16="http://schemas.microsoft.com/office/drawing/2014/main" val="10006"/>
+                    <a16:rowId xmlns:a16="http://schemas.microsoft.com/office/drawing/2014/main" xmlns="" val="10006"/>
                   </a:ext>
                 </a:extLst>
               </a:tr>
@@ -15174,7 +15526,7 @@
                 </a:tc>
                 <a:extLst>
                   <a:ext uri="{0D108BD9-81ED-4DB2-BD59-A6C34878D82A}">
-                    <a16:rowId xmlns="" xmlns:a16="http://schemas.microsoft.com/office/drawing/2014/main" val="10007"/>
+                    <a16:rowId xmlns:a16="http://schemas.microsoft.com/office/drawing/2014/main" xmlns="" val="10007"/>
                   </a:ext>
                 </a:extLst>
               </a:tr>
@@ -15189,7 +15541,7 @@
               <p:cNvPr id="13" name="Table 12">
                 <a:extLst>
                   <a:ext uri="{FF2B5EF4-FFF2-40B4-BE49-F238E27FC236}">
-                    <a16:creationId xmlns="" xmlns:a16="http://schemas.microsoft.com/office/drawing/2014/main" id="{0494280A-AA93-4D6A-827A-BB7B609A7172}"/>
+                    <a16:creationId xmlns:a16="http://schemas.microsoft.com/office/drawing/2014/main" xmlns="" id="{0494280A-AA93-4D6A-827A-BB7B609A7172}"/>
                   </a:ext>
                 </a:extLst>
               </p:cNvPr>
@@ -15218,7 +15570,7 @@
                     <a:gridCol w="3970655">
                       <a:extLst>
                         <a:ext uri="{9D8B030D-6E8A-4147-A177-3AD203B41FA5}">
-                          <a16:colId xmlns="" xmlns:a16="http://schemas.microsoft.com/office/drawing/2014/main" val="20000"/>
+                          <a16:colId xmlns:a16="http://schemas.microsoft.com/office/drawing/2014/main" xmlns="" val="20000"/>
                         </a:ext>
                       </a:extLst>
                     </a:gridCol>
@@ -15291,7 +15643,7 @@
                     </a:tc>
                     <a:extLst>
                       <a:ext uri="{0D108BD9-81ED-4DB2-BD59-A6C34878D82A}">
-                        <a16:rowId xmlns="" xmlns:a16="http://schemas.microsoft.com/office/drawing/2014/main" val="10000"/>
+                        <a16:rowId xmlns:a16="http://schemas.microsoft.com/office/drawing/2014/main" xmlns="" val="10000"/>
                       </a:ext>
                     </a:extLst>
                   </a:tr>
@@ -15383,7 +15735,7 @@
                     </a:tc>
                     <a:extLst>
                       <a:ext uri="{0D108BD9-81ED-4DB2-BD59-A6C34878D82A}">
-                        <a16:rowId xmlns="" xmlns:a16="http://schemas.microsoft.com/office/drawing/2014/main" val="10006"/>
+                        <a16:rowId xmlns:a16="http://schemas.microsoft.com/office/drawing/2014/main" xmlns="" val="10006"/>
                       </a:ext>
                     </a:extLst>
                   </a:tr>
@@ -15469,7 +15821,7 @@
                     </a:tc>
                     <a:extLst>
                       <a:ext uri="{0D108BD9-81ED-4DB2-BD59-A6C34878D82A}">
-                        <a16:rowId xmlns="" xmlns:a16="http://schemas.microsoft.com/office/drawing/2014/main" val="2650464264"/>
+                        <a16:rowId xmlns:a16="http://schemas.microsoft.com/office/drawing/2014/main" xmlns="" val="2650464264"/>
                       </a:ext>
                     </a:extLst>
                   </a:tr>
@@ -15571,7 +15923,7 @@
                     </a:tc>
                     <a:extLst>
                       <a:ext uri="{0D108BD9-81ED-4DB2-BD59-A6C34878D82A}">
-                        <a16:rowId xmlns="" xmlns:a16="http://schemas.microsoft.com/office/drawing/2014/main" val="1708595694"/>
+                        <a16:rowId xmlns:a16="http://schemas.microsoft.com/office/drawing/2014/main" xmlns="" val="1708595694"/>
                       </a:ext>
                     </a:extLst>
                   </a:tr>
@@ -15971,7 +16323,7 @@
                     </a:tc>
                     <a:extLst>
                       <a:ext uri="{0D108BD9-81ED-4DB2-BD59-A6C34878D82A}">
-                        <a16:rowId xmlns="" xmlns:a16="http://schemas.microsoft.com/office/drawing/2014/main" val="348125559"/>
+                        <a16:rowId xmlns:a16="http://schemas.microsoft.com/office/drawing/2014/main" xmlns="" val="348125559"/>
                       </a:ext>
                     </a:extLst>
                   </a:tr>
@@ -16294,7 +16646,7 @@
                     </a:tc>
                     <a:extLst>
                       <a:ext uri="{0D108BD9-81ED-4DB2-BD59-A6C34878D82A}">
-                        <a16:rowId xmlns="" xmlns:a16="http://schemas.microsoft.com/office/drawing/2014/main" val="3295806164"/>
+                        <a16:rowId xmlns:a16="http://schemas.microsoft.com/office/drawing/2014/main" xmlns="" val="3295806164"/>
                       </a:ext>
                     </a:extLst>
                   </a:tr>
@@ -16477,7 +16829,7 @@
                     </a:tc>
                     <a:extLst>
                       <a:ext uri="{0D108BD9-81ED-4DB2-BD59-A6C34878D82A}">
-                        <a16:rowId xmlns="" xmlns:a16="http://schemas.microsoft.com/office/drawing/2014/main" val="1091225448"/>
+                        <a16:rowId xmlns:a16="http://schemas.microsoft.com/office/drawing/2014/main" xmlns="" val="1091225448"/>
                       </a:ext>
                     </a:extLst>
                   </a:tr>
@@ -16594,7 +16946,7 @@
                     </a:tc>
                     <a:extLst>
                       <a:ext uri="{0D108BD9-81ED-4DB2-BD59-A6C34878D82A}">
-                        <a16:rowId xmlns="" xmlns:a16="http://schemas.microsoft.com/office/drawing/2014/main" val="10007"/>
+                        <a16:rowId xmlns:a16="http://schemas.microsoft.com/office/drawing/2014/main" xmlns="" val="10007"/>
                       </a:ext>
                     </a:extLst>
                   </a:tr>
@@ -17303,7 +17655,7 @@
           <p:cNvPr id="14" name="Table 13">
             <a:extLst>
               <a:ext uri="{FF2B5EF4-FFF2-40B4-BE49-F238E27FC236}">
-                <a16:creationId xmlns="" xmlns:a16="http://schemas.microsoft.com/office/drawing/2014/main" id="{FE508E2A-6AF5-4306-B60F-B65C0B85CD38}"/>
+                <a16:creationId xmlns:a16="http://schemas.microsoft.com/office/drawing/2014/main" xmlns="" id="{FE508E2A-6AF5-4306-B60F-B65C0B85CD38}"/>
               </a:ext>
             </a:extLst>
           </p:cNvPr>
@@ -17332,7 +17684,7 @@
                 <a:gridCol w="3970655">
                   <a:extLst>
                     <a:ext uri="{9D8B030D-6E8A-4147-A177-3AD203B41FA5}">
-                      <a16:colId xmlns="" xmlns:a16="http://schemas.microsoft.com/office/drawing/2014/main" val="20000"/>
+                      <a16:colId xmlns:a16="http://schemas.microsoft.com/office/drawing/2014/main" xmlns="" val="20000"/>
                     </a:ext>
                   </a:extLst>
                 </a:gridCol>
@@ -17405,7 +17757,7 @@
                 </a:tc>
                 <a:extLst>
                   <a:ext uri="{0D108BD9-81ED-4DB2-BD59-A6C34878D82A}">
-                    <a16:rowId xmlns="" xmlns:a16="http://schemas.microsoft.com/office/drawing/2014/main" val="10000"/>
+                    <a16:rowId xmlns:a16="http://schemas.microsoft.com/office/drawing/2014/main" xmlns="" val="10000"/>
                   </a:ext>
                 </a:extLst>
               </a:tr>
@@ -17497,7 +17849,7 @@
                 </a:tc>
                 <a:extLst>
                   <a:ext uri="{0D108BD9-81ED-4DB2-BD59-A6C34878D82A}">
-                    <a16:rowId xmlns="" xmlns:a16="http://schemas.microsoft.com/office/drawing/2014/main" val="10006"/>
+                    <a16:rowId xmlns:a16="http://schemas.microsoft.com/office/drawing/2014/main" xmlns="" val="10006"/>
                   </a:ext>
                 </a:extLst>
               </a:tr>
@@ -17583,7 +17935,7 @@
                 </a:tc>
                 <a:extLst>
                   <a:ext uri="{0D108BD9-81ED-4DB2-BD59-A6C34878D82A}">
-                    <a16:rowId xmlns="" xmlns:a16="http://schemas.microsoft.com/office/drawing/2014/main" val="2650464264"/>
+                    <a16:rowId xmlns:a16="http://schemas.microsoft.com/office/drawing/2014/main" xmlns="" val="2650464264"/>
                   </a:ext>
                 </a:extLst>
               </a:tr>
@@ -17666,7 +18018,7 @@
                 </a:tc>
                 <a:extLst>
                   <a:ext uri="{0D108BD9-81ED-4DB2-BD59-A6C34878D82A}">
-                    <a16:rowId xmlns="" xmlns:a16="http://schemas.microsoft.com/office/drawing/2014/main" val="1708595694"/>
+                    <a16:rowId xmlns:a16="http://schemas.microsoft.com/office/drawing/2014/main" xmlns="" val="1708595694"/>
                   </a:ext>
                 </a:extLst>
               </a:tr>
@@ -17783,7 +18135,7 @@
                 </a:tc>
                 <a:extLst>
                   <a:ext uri="{0D108BD9-81ED-4DB2-BD59-A6C34878D82A}">
-                    <a16:rowId xmlns="" xmlns:a16="http://schemas.microsoft.com/office/drawing/2014/main" val="10007"/>
+                    <a16:rowId xmlns:a16="http://schemas.microsoft.com/office/drawing/2014/main" xmlns="" val="10007"/>
                   </a:ext>
                 </a:extLst>
               </a:tr>

</xml_diff>